<commit_message>
remove pem script of Swarm yaml file
</commit_message>
<xml_diff>
--- a/toyProject.pptx
+++ b/toyProject.pptx
@@ -5,10 +5,11 @@
     <p:sldMasterId id="2147483660" r:id="rId1"/>
   </p:sldMasterIdLst>
   <p:sldIdLst>
-    <p:sldId id="256" r:id="rId2"/>
-    <p:sldId id="257" r:id="rId3"/>
-    <p:sldId id="258" r:id="rId4"/>
-    <p:sldId id="259" r:id="rId5"/>
+    <p:sldId id="257" r:id="rId2"/>
+    <p:sldId id="260" r:id="rId3"/>
+    <p:sldId id="256" r:id="rId4"/>
+    <p:sldId id="258" r:id="rId5"/>
+    <p:sldId id="259" r:id="rId6"/>
   </p:sldIdLst>
   <p:sldSz cx="12192000" cy="6858000"/>
   <p:notesSz cx="6858000" cy="9144000"/>
@@ -2976,351 +2977,10 @@
           <a:chExt cx="0" cy="0"/>
         </a:xfrm>
       </p:grpSpPr>
-      <p:sp>
-        <p:nvSpPr>
-          <p:cNvPr id="5" name="Rectangle 52">
-            <a:extLst>
-              <a:ext uri="{FF2B5EF4-FFF2-40B4-BE49-F238E27FC236}">
-                <a16:creationId xmlns:a16="http://schemas.microsoft.com/office/drawing/2014/main" id="{1F278302-448C-FE4E-A9C3-19500EFCD5C4}"/>
-              </a:ext>
-            </a:extLst>
-          </p:cNvPr>
-          <p:cNvSpPr/>
-          <p:nvPr/>
-        </p:nvSpPr>
-        <p:spPr>
-          <a:xfrm>
-            <a:off x="475129" y="298418"/>
-            <a:ext cx="6321325" cy="6330260"/>
-          </a:xfrm>
-          <a:prstGeom prst="rect">
-            <a:avLst/>
-          </a:prstGeom>
-          <a:noFill/>
-          <a:ln w="12700">
-            <a:solidFill>
-              <a:srgbClr val="6CAE3E"/>
-            </a:solidFill>
-          </a:ln>
-        </p:spPr>
-        <p:style>
-          <a:lnRef idx="2">
-            <a:schemeClr val="accent1">
-              <a:shade val="50000"/>
-            </a:schemeClr>
-          </a:lnRef>
-          <a:fillRef idx="1">
-            <a:schemeClr val="accent1"/>
-          </a:fillRef>
-          <a:effectRef idx="0">
-            <a:schemeClr val="accent1"/>
-          </a:effectRef>
-          <a:fontRef idx="minor">
-            <a:schemeClr val="lt1"/>
-          </a:fontRef>
-        </p:style>
-        <p:txBody>
-          <a:bodyPr rot="0" spcFirstLastPara="0" vertOverflow="overflow" horzOverflow="overflow" vert="horz" wrap="square" lIns="457200" tIns="91440" rIns="91440" bIns="45720" numCol="1" spcCol="0" rtlCol="0" fromWordArt="0" anchor="t" anchorCtr="0" forceAA="0" compatLnSpc="1">
-            <a:prstTxWarp prst="textNoShape">
-              <a:avLst/>
-            </a:prstTxWarp>
-            <a:noAutofit/>
-          </a:bodyPr>
-          <a:lstStyle/>
-          <a:p>
-            <a:pPr marL="18288" algn="l"/>
-            <a:r>
-              <a:rPr lang="en-US" sz="1200" b="1" dirty="0" smtClean="0">
-                <a:ln w="0"/>
-                <a:solidFill>
-                  <a:srgbClr val="6CAE3E"/>
-                </a:solidFill>
-                <a:latin typeface="Arial" panose="020B0604020202020204" pitchFamily="34" charset="0"/>
-                <a:cs typeface="Arial" panose="020B0604020202020204" pitchFamily="34" charset="0"/>
-              </a:rPr>
-              <a:t>         VPC(10.0.0.0/16)</a:t>
-            </a:r>
-            <a:endParaRPr lang="en-US" sz="1200" b="1" dirty="0">
-              <a:ln w="0"/>
-              <a:solidFill>
-                <a:srgbClr val="6CAE3E"/>
-              </a:solidFill>
-              <a:latin typeface="Arial" panose="020B0604020202020204" pitchFamily="34" charset="0"/>
-              <a:cs typeface="Arial" panose="020B0604020202020204" pitchFamily="34" charset="0"/>
-            </a:endParaRPr>
-          </a:p>
-        </p:txBody>
-      </p:sp>
-      <p:pic>
-        <p:nvPicPr>
-          <p:cNvPr id="7" name="Graphic 70">
-            <a:extLst>
-              <a:ext uri="{FF2B5EF4-FFF2-40B4-BE49-F238E27FC236}">
-                <a16:creationId xmlns:a16="http://schemas.microsoft.com/office/drawing/2014/main" id="{4C7502D1-F1AA-BE47-AB68-4953F6ECCF24}"/>
-              </a:ext>
-            </a:extLst>
-          </p:cNvPr>
-          <p:cNvPicPr>
-            <a:picLocks noChangeAspect="1"/>
-          </p:cNvPicPr>
-          <p:nvPr/>
-        </p:nvPicPr>
-        <p:blipFill>
-          <a:blip r:embed="rId2">
-            <a:extLst>
-              <a:ext uri="{96DAC541-7B7A-43D3-8B79-37D633B846F1}">
-                <asvg:svgBlip xmlns:asvg="http://schemas.microsoft.com/office/drawing/2016/SVG/main" xmlns="" r:embed="rId11"/>
-              </a:ext>
-            </a:extLst>
-          </a:blip>
-          <a:stretch>
-            <a:fillRect/>
-          </a:stretch>
-        </p:blipFill>
-        <p:spPr>
-          <a:xfrm>
-            <a:off x="475129" y="289105"/>
-            <a:ext cx="531221" cy="486485"/>
-          </a:xfrm>
-          <a:prstGeom prst="rect">
-            <a:avLst/>
-          </a:prstGeom>
-        </p:spPr>
-      </p:pic>
-      <p:pic>
-        <p:nvPicPr>
-          <p:cNvPr id="8" name="Graphic 49">
-            <a:extLst>
-              <a:ext uri="{FF2B5EF4-FFF2-40B4-BE49-F238E27FC236}">
-                <a16:creationId xmlns:a16="http://schemas.microsoft.com/office/drawing/2014/main" id="{6750C5FE-020A-BF4F-B3E8-0145F8C0FFE0}"/>
-              </a:ext>
-            </a:extLst>
-          </p:cNvPr>
-          <p:cNvPicPr>
-            <a:picLocks noChangeAspect="1"/>
-          </p:cNvPicPr>
-          <p:nvPr/>
-        </p:nvPicPr>
-        <p:blipFill>
-          <a:blip r:embed="rId12">
-            <a:extLst>
-              <a:ext uri="{96DAC541-7B7A-43D3-8B79-37D633B846F1}">
-                <asvg:svgBlip xmlns:asvg="http://schemas.microsoft.com/office/drawing/2016/SVG/main" xmlns="" r:embed="rId13"/>
-              </a:ext>
-            </a:extLst>
-          </a:blip>
-          <a:stretch>
-            <a:fillRect/>
-          </a:stretch>
-        </p:blipFill>
-        <p:spPr>
-          <a:xfrm>
-            <a:off x="3264855" y="0"/>
-            <a:ext cx="741872" cy="679396"/>
-          </a:xfrm>
-          <a:prstGeom prst="rect">
-            <a:avLst/>
-          </a:prstGeom>
-        </p:spPr>
-      </p:pic>
-      <p:sp>
-        <p:nvSpPr>
-          <p:cNvPr id="9" name="Rectangle 36">
-            <a:extLst>
-              <a:ext uri="{FF2B5EF4-FFF2-40B4-BE49-F238E27FC236}">
-                <a16:creationId xmlns:a16="http://schemas.microsoft.com/office/drawing/2014/main" id="{A44F3825-172F-C84B-9C0C-FC3B6AA72957}"/>
-              </a:ext>
-            </a:extLst>
-          </p:cNvPr>
-          <p:cNvSpPr/>
-          <p:nvPr/>
-        </p:nvSpPr>
-        <p:spPr>
-          <a:xfrm>
-            <a:off x="1105101" y="994527"/>
-            <a:ext cx="5049514" cy="5357034"/>
-          </a:xfrm>
-          <a:prstGeom prst="rect">
-            <a:avLst/>
-          </a:prstGeom>
-          <a:noFill/>
-          <a:ln w="12700">
-            <a:solidFill>
-              <a:srgbClr val="03A0C7"/>
-            </a:solidFill>
-            <a:prstDash val="sysDash"/>
-          </a:ln>
-        </p:spPr>
-        <p:style>
-          <a:lnRef idx="2">
-            <a:schemeClr val="accent1">
-              <a:shade val="50000"/>
-            </a:schemeClr>
-          </a:lnRef>
-          <a:fillRef idx="1">
-            <a:schemeClr val="accent1"/>
-          </a:fillRef>
-          <a:effectRef idx="0">
-            <a:schemeClr val="accent1"/>
-          </a:effectRef>
-          <a:fontRef idx="minor">
-            <a:schemeClr val="lt1"/>
-          </a:fontRef>
-        </p:style>
-        <p:txBody>
-          <a:bodyPr lIns="502920" tIns="91440"/>
-          <a:lstStyle/>
-          <a:p>
-            <a:pPr eaLnBrk="1" fontAlgn="auto" hangingPunct="1">
-              <a:spcBef>
-                <a:spcPts val="0"/>
-              </a:spcBef>
-              <a:spcAft>
-                <a:spcPts val="0"/>
-              </a:spcAft>
-              <a:defRPr/>
-            </a:pPr>
-            <a:endParaRPr lang="en-US" sz="1200" dirty="0">
-              <a:solidFill>
-                <a:srgbClr val="03A0C7"/>
-              </a:solidFill>
-              <a:latin typeface="Arial" panose="020B0604020202020204" pitchFamily="34" charset="0"/>
-              <a:cs typeface="Arial" panose="020B0604020202020204" pitchFamily="34" charset="0"/>
-            </a:endParaRPr>
-          </a:p>
-        </p:txBody>
-      </p:sp>
-      <p:sp>
-        <p:nvSpPr>
-          <p:cNvPr id="12" name="TextBox 11"/>
-          <p:cNvSpPr txBox="1"/>
-          <p:nvPr/>
-        </p:nvSpPr>
-        <p:spPr>
-          <a:xfrm>
-            <a:off x="852854" y="778535"/>
-            <a:ext cx="1459523" cy="369332"/>
-          </a:xfrm>
-          <a:prstGeom prst="rect">
-            <a:avLst/>
-          </a:prstGeom>
-          <a:noFill/>
-        </p:spPr>
-        <p:txBody>
-          <a:bodyPr wrap="square" rtlCol="0">
-            <a:spAutoFit/>
-          </a:bodyPr>
-          <a:lstStyle/>
-          <a:p>
-            <a:r>
-              <a:rPr lang="en-US" altLang="ko-KR" dirty="0" smtClean="0">
-                <a:solidFill>
-                  <a:srgbClr val="00B0F0"/>
-                </a:solidFill>
-              </a:rPr>
-              <a:t>Public Subnet</a:t>
-            </a:r>
-          </a:p>
-        </p:txBody>
-      </p:sp>
-      <p:sp>
-        <p:nvSpPr>
-          <p:cNvPr id="2" name="TextBox 1"/>
-          <p:cNvSpPr txBox="1"/>
-          <p:nvPr/>
-        </p:nvSpPr>
-        <p:spPr>
-          <a:xfrm>
-            <a:off x="9449001" y="2263219"/>
-            <a:ext cx="3097622" cy="1200329"/>
-          </a:xfrm>
-          <a:prstGeom prst="rect">
-            <a:avLst/>
-          </a:prstGeom>
-          <a:noFill/>
-        </p:spPr>
-        <p:txBody>
-          <a:bodyPr wrap="square" rtlCol="0">
-            <a:spAutoFit/>
-          </a:bodyPr>
-          <a:lstStyle/>
-          <a:p>
-            <a:r>
-              <a:rPr lang="ko-KR" altLang="en-US" dirty="0" smtClean="0"/>
-              <a:t>여기다 완성된 </a:t>
-            </a:r>
-            <a:r>
-              <a:rPr lang="ko-KR" altLang="en-US" dirty="0" err="1" smtClean="0"/>
-              <a:t>아키텍쳐의</a:t>
-            </a:r>
-            <a:r>
-              <a:rPr lang="ko-KR" altLang="en-US" dirty="0" smtClean="0"/>
-              <a:t> 모습을 구현하고</a:t>
-            </a:r>
-            <a:endParaRPr lang="en-US" altLang="ko-KR" dirty="0" smtClean="0"/>
-          </a:p>
-          <a:p>
-            <a:r>
-              <a:rPr lang="ko-KR" altLang="en-US" dirty="0" smtClean="0"/>
-              <a:t>다음 장 </a:t>
-            </a:r>
-            <a:r>
-              <a:rPr lang="ko-KR" altLang="en-US" dirty="0" err="1" smtClean="0"/>
-              <a:t>부터</a:t>
-            </a:r>
-            <a:r>
-              <a:rPr lang="ko-KR" altLang="en-US" dirty="0" smtClean="0"/>
-              <a:t> 하나씩 풀어나가는 방식</a:t>
-            </a:r>
-            <a:endParaRPr lang="ko-KR" altLang="en-US" dirty="0"/>
-          </a:p>
-        </p:txBody>
-      </p:sp>
-      <p:sp>
-        <p:nvSpPr>
-          <p:cNvPr id="6" name="TextBox 5"/>
-          <p:cNvSpPr txBox="1"/>
-          <p:nvPr/>
-        </p:nvSpPr>
-        <p:spPr>
-          <a:xfrm>
-            <a:off x="9540294" y="4231824"/>
-            <a:ext cx="2754363" cy="1200329"/>
-          </a:xfrm>
-          <a:prstGeom prst="rect">
-            <a:avLst/>
-          </a:prstGeom>
-          <a:noFill/>
-        </p:spPr>
-        <p:txBody>
-          <a:bodyPr wrap="square" rtlCol="0">
-            <a:spAutoFit/>
-          </a:bodyPr>
-          <a:lstStyle/>
-          <a:p>
-            <a:r>
-              <a:rPr lang="en-US" altLang="ko-KR" dirty="0" smtClean="0"/>
-              <a:t>10.0.0.100(master) 10.0.0.101(worker1)</a:t>
-            </a:r>
-          </a:p>
-          <a:p>
-            <a:r>
-              <a:rPr lang="en-US" altLang="ko-KR" dirty="0" smtClean="0"/>
-              <a:t>10.0.0.102(worker2)</a:t>
-            </a:r>
-          </a:p>
-          <a:p>
-            <a:r>
-              <a:rPr lang="en-US" altLang="ko-KR" dirty="0" smtClean="0"/>
-              <a:t>10.0.0.103(worker3)</a:t>
-            </a:r>
-          </a:p>
-        </p:txBody>
-      </p:sp>
     </p:spTree>
     <p:extLst>
       <p:ext uri="{BB962C8B-B14F-4D97-AF65-F5344CB8AC3E}">
-        <p14:creationId xmlns:p14="http://schemas.microsoft.com/office/powerpoint/2010/main" val="3182543127"/>
+        <p14:creationId xmlns:p14="http://schemas.microsoft.com/office/powerpoint/2010/main" val="3057756727"/>
       </p:ext>
     </p:extLst>
   </p:cSld>
@@ -3356,7 +3016,7 @@
       </p:grpSpPr>
       <p:sp>
         <p:nvSpPr>
-          <p:cNvPr id="8" name="제목 7"/>
+          <p:cNvPr id="2" name="제목 1"/>
           <p:cNvSpPr>
             <a:spLocks noGrp="1"/>
           </p:cNvSpPr>
@@ -3364,41 +3024,167 @@
             <p:ph type="title"/>
           </p:nvPr>
         </p:nvSpPr>
-        <p:spPr>
-          <a:xfrm>
-            <a:off x="838200" y="311336"/>
-            <a:ext cx="10515600" cy="1325563"/>
-          </a:xfrm>
-        </p:spPr>
+        <p:spPr/>
         <p:txBody>
           <a:bodyPr/>
           <a:lstStyle/>
           <a:p>
-            <a:pPr algn="ctr"/>
             <a:r>
               <a:rPr lang="en-US" altLang="ko-KR" dirty="0" smtClean="0"/>
-              <a:t>Cloud </a:t>
+              <a:t> </a:t>
+            </a:r>
+            <a:r>
+              <a:rPr lang="ko-KR" altLang="en-US" dirty="0" smtClean="0"/>
+              <a:t>프로젝트 소개</a:t>
+            </a:r>
+            <a:endParaRPr lang="ko-KR" altLang="en-US" dirty="0"/>
+          </a:p>
+        </p:txBody>
+      </p:sp>
+      <p:sp>
+        <p:nvSpPr>
+          <p:cNvPr id="3" name="내용 개체 틀 2"/>
+          <p:cNvSpPr>
+            <a:spLocks noGrp="1"/>
+          </p:cNvSpPr>
+          <p:nvPr>
+            <p:ph idx="1"/>
+          </p:nvPr>
+        </p:nvSpPr>
+        <p:spPr/>
+        <p:txBody>
+          <a:bodyPr/>
+          <a:lstStyle/>
+          <a:p>
+            <a:r>
+              <a:rPr lang="ko-KR" altLang="en-US" dirty="0"/>
+              <a:t>점점 커져가는 </a:t>
+            </a:r>
+            <a:r>
+              <a:rPr lang="en-US" altLang="ko-KR" dirty="0"/>
+              <a:t>IT </a:t>
+            </a:r>
+            <a:r>
+              <a:rPr lang="ko-KR" altLang="en-US" dirty="0"/>
+              <a:t>생태계 환경에 적응하기 위해 여러 기업에서 </a:t>
+            </a:r>
+            <a:r>
+              <a:rPr lang="ko-KR" altLang="en-US" dirty="0" smtClean="0"/>
+              <a:t>커져가는 </a:t>
+            </a:r>
+            <a:r>
+              <a:rPr lang="ko-KR" altLang="en-US" dirty="0"/>
+              <a:t>인프라 환경에  대해 다양한 솔루션을 제공하고 있습니다</a:t>
             </a:r>
             <a:r>
               <a:rPr lang="en-US" altLang="ko-KR" dirty="0" smtClean="0"/>
-              <a:t>Formation </a:t>
+              <a:t>.</a:t>
+            </a:r>
+          </a:p>
+          <a:p>
+            <a:r>
+              <a:rPr lang="ko-KR" altLang="en-US" dirty="0" smtClean="0"/>
+              <a:t>그 중에서도   </a:t>
+            </a:r>
+            <a:r>
+              <a:rPr lang="en-US" altLang="ko-KR" b="1" dirty="0"/>
+              <a:t>Monolithic </a:t>
+            </a:r>
+            <a:r>
+              <a:rPr lang="en-US" altLang="ko-KR" b="1" dirty="0" smtClean="0"/>
+              <a:t>Architecture</a:t>
+            </a:r>
+            <a:r>
+              <a:rPr lang="ko-KR" altLang="en-US" b="1" dirty="0" smtClean="0"/>
+              <a:t>에서 </a:t>
+            </a:r>
+            <a:r>
+              <a:rPr lang="en-US" altLang="ko-KR" b="1" dirty="0" smtClean="0"/>
+              <a:t>MSA Architecture</a:t>
+            </a:r>
+            <a:r>
+              <a:rPr lang="ko-KR" altLang="en-US" b="1" dirty="0" smtClean="0"/>
+              <a:t>로 </a:t>
+            </a:r>
+            <a:r>
+              <a:rPr lang="ko-KR" altLang="en-US" dirty="0" smtClean="0"/>
+              <a:t>빠르게 변화하고 있는 추세 입니다</a:t>
             </a:r>
             <a:r>
               <a:rPr lang="en-US" altLang="ko-KR" dirty="0" smtClean="0"/>
-              <a:t>cluster Network</a:t>
-            </a:r>
+              <a:t>. </a:t>
+            </a:r>
+          </a:p>
+          <a:p>
             <a:r>
               <a:rPr lang="ko-KR" altLang="en-US" dirty="0" smtClean="0"/>
-              <a:t>생성</a:t>
-            </a:r>
-            <a:endParaRPr lang="ko-KR" altLang="en-US" dirty="0"/>
+              <a:t>저는 </a:t>
+            </a:r>
+            <a:r>
+              <a:rPr lang="en-US" altLang="ko-KR" dirty="0" smtClean="0"/>
+              <a:t>MSA </a:t>
+            </a:r>
+            <a:r>
+              <a:rPr lang="en-US" altLang="ko-KR" dirty="0"/>
+              <a:t>CICD </a:t>
+            </a:r>
+            <a:r>
+              <a:rPr lang="ko-KR" altLang="en-US" dirty="0"/>
+              <a:t>개발 환경을 구축하기 위해 </a:t>
+            </a:r>
+            <a:r>
+              <a:rPr lang="en-US" altLang="ko-KR" dirty="0"/>
+              <a:t>Docker</a:t>
+            </a:r>
+            <a:r>
+              <a:rPr lang="ko-KR" altLang="en-US" dirty="0"/>
+              <a:t>기반인 </a:t>
+            </a:r>
+            <a:r>
+              <a:rPr lang="en-US" altLang="ko-KR" dirty="0"/>
+              <a:t>Docker </a:t>
+            </a:r>
+            <a:r>
+              <a:rPr lang="en-US" altLang="ko-KR" dirty="0" smtClean="0"/>
+              <a:t>swarm</a:t>
+            </a:r>
+            <a:r>
+              <a:rPr lang="ko-KR" altLang="en-US" dirty="0" smtClean="0"/>
+              <a:t>기술을 활용하여 </a:t>
+            </a:r>
+            <a:r>
+              <a:rPr lang="en-US" altLang="ko-KR" dirty="0" smtClean="0"/>
+              <a:t>Cluster</a:t>
+            </a:r>
+            <a:r>
+              <a:rPr lang="ko-KR" altLang="en-US" dirty="0"/>
+              <a:t>환경을 </a:t>
+            </a:r>
+            <a:r>
+              <a:rPr lang="ko-KR" altLang="en-US" dirty="0" smtClean="0"/>
+              <a:t>구축해 보았습니다</a:t>
+            </a:r>
+            <a:r>
+              <a:rPr lang="en-US" altLang="ko-KR" dirty="0" smtClean="0"/>
+              <a:t>.</a:t>
+            </a:r>
+            <a:endParaRPr lang="en-US" altLang="ko-KR" dirty="0"/>
+          </a:p>
+          <a:p>
+            <a:endParaRPr lang="en-US" altLang="ko-KR" dirty="0" smtClean="0"/>
+          </a:p>
+          <a:p>
+            <a:endParaRPr lang="en-US" altLang="ko-KR" dirty="0" smtClean="0"/>
+          </a:p>
+          <a:p>
+            <a:endParaRPr lang="en-US" altLang="ko-KR" dirty="0" smtClean="0"/>
           </a:p>
         </p:txBody>
       </p:sp>
     </p:spTree>
     <p:extLst>
       <p:ext uri="{BB962C8B-B14F-4D97-AF65-F5344CB8AC3E}">
-        <p14:creationId xmlns:p14="http://schemas.microsoft.com/office/powerpoint/2010/main" val="3057756727"/>
+        <p14:creationId xmlns:p14="http://schemas.microsoft.com/office/powerpoint/2010/main" val="1109178991"/>
       </p:ext>
     </p:extLst>
   </p:cSld>
@@ -3434,80 +3220,192 @@
       </p:grpSpPr>
       <p:sp>
         <p:nvSpPr>
-          <p:cNvPr id="2" name="제목 1"/>
-          <p:cNvSpPr>
-            <a:spLocks noGrp="1"/>
-          </p:cNvSpPr>
-          <p:nvPr>
-            <p:ph type="title"/>
-          </p:nvPr>
+          <p:cNvPr id="5" name="Rectangle 52">
+            <a:extLst>
+              <a:ext uri="{FF2B5EF4-FFF2-40B4-BE49-F238E27FC236}">
+                <a16:creationId xmlns:a16="http://schemas.microsoft.com/office/drawing/2014/main" id="{1F278302-448C-FE4E-A9C3-19500EFCD5C4}"/>
+              </a:ext>
+            </a:extLst>
+          </p:cNvPr>
+          <p:cNvSpPr/>
+          <p:nvPr/>
         </p:nvSpPr>
         <p:spPr>
           <a:xfrm>
-            <a:off x="794239" y="664064"/>
-            <a:ext cx="10515600" cy="1140897"/>
+            <a:off x="202223" y="289105"/>
+            <a:ext cx="6594231" cy="6339573"/>
           </a:xfrm>
+          <a:prstGeom prst="rect">
+            <a:avLst/>
+          </a:prstGeom>
+          <a:noFill/>
+          <a:ln w="12700">
+            <a:solidFill>
+              <a:srgbClr val="6CAE3E"/>
+            </a:solidFill>
+          </a:ln>
         </p:spPr>
-        <p:txBody>
-          <a:bodyPr>
-            <a:normAutofit fontScale="90000"/>
+        <p:style>
+          <a:lnRef idx="2">
+            <a:schemeClr val="accent1">
+              <a:shade val="50000"/>
+            </a:schemeClr>
+          </a:lnRef>
+          <a:fillRef idx="1">
+            <a:schemeClr val="accent1"/>
+          </a:fillRef>
+          <a:effectRef idx="0">
+            <a:schemeClr val="accent1"/>
+          </a:effectRef>
+          <a:fontRef idx="minor">
+            <a:schemeClr val="lt1"/>
+          </a:fontRef>
+        </p:style>
+        <p:txBody>
+          <a:bodyPr rot="0" spcFirstLastPara="0" vertOverflow="overflow" horzOverflow="overflow" vert="horz" wrap="square" lIns="457200" tIns="91440" rIns="91440" bIns="45720" numCol="1" spcCol="0" rtlCol="0" fromWordArt="0" anchor="t" anchorCtr="0" forceAA="0" compatLnSpc="1">
+            <a:prstTxWarp prst="textNoShape">
+              <a:avLst/>
+            </a:prstTxWarp>
+            <a:noAutofit/>
           </a:bodyPr>
           <a:lstStyle/>
           <a:p>
-            <a:pPr algn="ctr"/>
-            <a:r>
-              <a:rPr lang="en-US" altLang="ko-KR" dirty="0" smtClean="0"/>
-              <a:t>  </a:t>
-            </a:r>
-            <a:r>
-              <a:rPr lang="en-US" altLang="ko-KR" dirty="0" smtClean="0">
+            <a:pPr marL="18288" algn="l"/>
+            <a:r>
+              <a:rPr lang="en-US" sz="1200" b="1" dirty="0" smtClean="0">
+                <a:ln w="0"/>
                 <a:solidFill>
-                  <a:srgbClr val="FFC000"/>
+                  <a:srgbClr val="6CAE3E"/>
                 </a:solidFill>
+                <a:latin typeface="Arial" panose="020B0604020202020204" pitchFamily="34" charset="0"/>
+                <a:cs typeface="Arial" panose="020B0604020202020204" pitchFamily="34" charset="0"/>
               </a:rPr>
-              <a:t>Cloud </a:t>
-            </a:r>
-            <a:r>
-              <a:rPr lang="en-US" altLang="ko-KR" dirty="0" smtClean="0">
-                <a:solidFill>
-                  <a:srgbClr val="FFC000"/>
-                </a:solidFill>
-              </a:rPr>
-              <a:t>Formation</a:t>
-            </a:r>
-            <a:r>
-              <a:rPr lang="en-US" altLang="ko-KR" dirty="0" smtClean="0"/>
-              <a:t> </a:t>
-            </a:r>
-            <a:r>
-              <a:rPr lang="en-US" altLang="ko-KR" dirty="0" smtClean="0"/>
-              <a:t>Master </a:t>
-            </a:r>
-            <a:r>
-              <a:rPr lang="en-US" altLang="ko-KR" dirty="0" err="1" smtClean="0"/>
-              <a:t>Userdata</a:t>
-            </a:r>
-            <a:r>
-              <a:rPr lang="en-US" altLang="ko-KR" dirty="0"/>
-              <a:t/>
-            </a:r>
-            <a:br>
-              <a:rPr lang="en-US" altLang="ko-KR" dirty="0"/>
-            </a:br>
-            <a:endParaRPr lang="ko-KR" altLang="en-US" dirty="0"/>
-          </a:p>
-        </p:txBody>
-      </p:sp>
-      <p:sp>
-        <p:nvSpPr>
-          <p:cNvPr id="7" name="TextBox 6"/>
+              <a:t>         VPC(10.0.0.0/16)</a:t>
+            </a:r>
+            <a:endParaRPr lang="en-US" sz="1200" b="1" dirty="0">
+              <a:ln w="0"/>
+              <a:solidFill>
+                <a:srgbClr val="6CAE3E"/>
+              </a:solidFill>
+              <a:latin typeface="Arial" panose="020B0604020202020204" pitchFamily="34" charset="0"/>
+              <a:cs typeface="Arial" panose="020B0604020202020204" pitchFamily="34" charset="0"/>
+            </a:endParaRPr>
+          </a:p>
+        </p:txBody>
+      </p:sp>
+      <p:pic>
+        <p:nvPicPr>
+          <p:cNvPr id="7" name="Graphic 70">
+            <a:extLst>
+              <a:ext uri="{FF2B5EF4-FFF2-40B4-BE49-F238E27FC236}">
+                <a16:creationId xmlns:a16="http://schemas.microsoft.com/office/drawing/2014/main" id="{4C7502D1-F1AA-BE47-AB68-4953F6ECCF24}"/>
+              </a:ext>
+            </a:extLst>
+          </p:cNvPr>
+          <p:cNvPicPr>
+            <a:picLocks noChangeAspect="1"/>
+          </p:cNvPicPr>
+          <p:nvPr/>
+        </p:nvPicPr>
+        <p:blipFill>
+          <a:blip r:embed="rId2">
+            <a:extLst>
+              <a:ext uri="{96DAC541-7B7A-43D3-8B79-37D633B846F1}">
+                <asvg:svgBlip xmlns="" xmlns:asvg="http://schemas.microsoft.com/office/drawing/2016/SVG/main" r:embed="rId11"/>
+              </a:ext>
+            </a:extLst>
+          </a:blip>
+          <a:stretch>
+            <a:fillRect/>
+          </a:stretch>
+        </p:blipFill>
+        <p:spPr>
+          <a:xfrm>
+            <a:off x="209518" y="301575"/>
+            <a:ext cx="412566" cy="377822"/>
+          </a:xfrm>
+          <a:prstGeom prst="rect">
+            <a:avLst/>
+          </a:prstGeom>
+        </p:spPr>
+      </p:pic>
+      <p:sp>
+        <p:nvSpPr>
+          <p:cNvPr id="9" name="Rectangle 36">
+            <a:extLst>
+              <a:ext uri="{FF2B5EF4-FFF2-40B4-BE49-F238E27FC236}">
+                <a16:creationId xmlns:a16="http://schemas.microsoft.com/office/drawing/2014/main" id="{A44F3825-172F-C84B-9C0C-FC3B6AA72957}"/>
+              </a:ext>
+            </a:extLst>
+          </p:cNvPr>
+          <p:cNvSpPr/>
+          <p:nvPr/>
+        </p:nvSpPr>
+        <p:spPr>
+          <a:xfrm>
+            <a:off x="622084" y="691868"/>
+            <a:ext cx="5796301" cy="5659694"/>
+          </a:xfrm>
+          <a:prstGeom prst="rect">
+            <a:avLst/>
+          </a:prstGeom>
+          <a:noFill/>
+          <a:ln w="12700">
+            <a:solidFill>
+              <a:srgbClr val="03A0C7"/>
+            </a:solidFill>
+            <a:prstDash val="sysDash"/>
+          </a:ln>
+        </p:spPr>
+        <p:style>
+          <a:lnRef idx="2">
+            <a:schemeClr val="accent1">
+              <a:shade val="50000"/>
+            </a:schemeClr>
+          </a:lnRef>
+          <a:fillRef idx="1">
+            <a:schemeClr val="accent1"/>
+          </a:fillRef>
+          <a:effectRef idx="0">
+            <a:schemeClr val="accent1"/>
+          </a:effectRef>
+          <a:fontRef idx="minor">
+            <a:schemeClr val="lt1"/>
+          </a:fontRef>
+        </p:style>
+        <p:txBody>
+          <a:bodyPr lIns="502920" tIns="91440"/>
+          <a:lstStyle/>
+          <a:p>
+            <a:pPr eaLnBrk="1" fontAlgn="auto" hangingPunct="1">
+              <a:spcBef>
+                <a:spcPts val="0"/>
+              </a:spcBef>
+              <a:spcAft>
+                <a:spcPts val="0"/>
+              </a:spcAft>
+              <a:defRPr/>
+            </a:pPr>
+            <a:endParaRPr lang="en-US" sz="1200" dirty="0">
+              <a:solidFill>
+                <a:srgbClr val="03A0C7"/>
+              </a:solidFill>
+              <a:latin typeface="Arial" panose="020B0604020202020204" pitchFamily="34" charset="0"/>
+              <a:cs typeface="Arial" panose="020B0604020202020204" pitchFamily="34" charset="0"/>
+            </a:endParaRPr>
+          </a:p>
+        </p:txBody>
+      </p:sp>
+      <p:sp>
+        <p:nvSpPr>
+          <p:cNvPr id="12" name="TextBox 11"/>
           <p:cNvSpPr txBox="1"/>
           <p:nvPr/>
         </p:nvSpPr>
         <p:spPr>
           <a:xfrm>
-            <a:off x="5616087" y="2241983"/>
-            <a:ext cx="871904" cy="369332"/>
+            <a:off x="2790472" y="507202"/>
+            <a:ext cx="1459523" cy="369332"/>
           </a:xfrm>
           <a:prstGeom prst="rect">
             <a:avLst/>
@@ -3523,37 +3421,460 @@
             <a:r>
               <a:rPr lang="en-US" altLang="ko-KR" dirty="0" smtClean="0">
                 <a:solidFill>
-                  <a:srgbClr val="FF0000"/>
+                  <a:srgbClr val="00B0F0"/>
                 </a:solidFill>
               </a:rPr>
-              <a:t>Master</a:t>
-            </a:r>
-            <a:endParaRPr lang="ko-KR" altLang="en-US" dirty="0">
+              <a:t>Public Subnet</a:t>
+            </a:r>
+          </a:p>
+        </p:txBody>
+      </p:sp>
+      <p:sp>
+        <p:nvSpPr>
+          <p:cNvPr id="10" name="Rectangle 45">
+            <a:extLst>
+              <a:ext uri="{FF2B5EF4-FFF2-40B4-BE49-F238E27FC236}">
+                <a16:creationId xmlns:a16="http://schemas.microsoft.com/office/drawing/2014/main" id="{DE1D7014-BE11-C843-9F72-50FC09E9753B}"/>
+              </a:ext>
+            </a:extLst>
+          </p:cNvPr>
+          <p:cNvSpPr/>
+          <p:nvPr/>
+        </p:nvSpPr>
+        <p:spPr>
+          <a:xfrm>
+            <a:off x="941690" y="4978962"/>
+            <a:ext cx="4975532" cy="1132286"/>
+          </a:xfrm>
+          <a:prstGeom prst="rect">
+            <a:avLst/>
+          </a:prstGeom>
+          <a:noFill/>
+          <a:ln w="12700">
+            <a:solidFill>
+              <a:srgbClr val="FF9902"/>
+            </a:solidFill>
+          </a:ln>
+        </p:spPr>
+        <p:style>
+          <a:lnRef idx="2">
+            <a:schemeClr val="accent1">
+              <a:shade val="50000"/>
+            </a:schemeClr>
+          </a:lnRef>
+          <a:fillRef idx="1">
+            <a:schemeClr val="accent1"/>
+          </a:fillRef>
+          <a:effectRef idx="0">
+            <a:schemeClr val="accent1"/>
+          </a:effectRef>
+          <a:fontRef idx="minor">
+            <a:schemeClr val="lt1"/>
+          </a:fontRef>
+        </p:style>
+        <p:txBody>
+          <a:bodyPr lIns="502920" tIns="91440"/>
+          <a:lstStyle/>
+          <a:p>
+            <a:pPr algn="ctr" eaLnBrk="1" fontAlgn="auto" hangingPunct="1">
+              <a:spcBef>
+                <a:spcPts val="0"/>
+              </a:spcBef>
+              <a:spcAft>
+                <a:spcPts val="0"/>
+              </a:spcAft>
+              <a:defRPr/>
+            </a:pPr>
+            <a:r>
+              <a:rPr lang="en-US" sz="1000" dirty="0" smtClean="0">
+                <a:ln w="0"/>
+                <a:solidFill>
+                  <a:srgbClr val="FF9902"/>
+                </a:solidFill>
+                <a:latin typeface="Arial" panose="020B0604020202020204" pitchFamily="34" charset="0"/>
+                <a:cs typeface="Arial" panose="020B0604020202020204" pitchFamily="34" charset="0"/>
+              </a:rPr>
+              <a:t>Worker3(10.0.0.100)</a:t>
+            </a:r>
+            <a:endParaRPr lang="en-US" sz="1000" dirty="0">
+              <a:ln w="0"/>
               <a:solidFill>
-                <a:srgbClr val="FF0000"/>
+                <a:srgbClr val="FF9902"/>
               </a:solidFill>
+              <a:latin typeface="Arial" panose="020B0604020202020204" pitchFamily="34" charset="0"/>
+              <a:cs typeface="Arial" panose="020B0604020202020204" pitchFamily="34" charset="0"/>
             </a:endParaRPr>
           </a:p>
         </p:txBody>
       </p:sp>
       <p:pic>
         <p:nvPicPr>
-          <p:cNvPr id="12" name="그림 11"/>
+          <p:cNvPr id="11" name="Graphic 49">
+            <a:extLst>
+              <a:ext uri="{FF2B5EF4-FFF2-40B4-BE49-F238E27FC236}">
+                <a16:creationId xmlns:a16="http://schemas.microsoft.com/office/drawing/2014/main" id="{51695F39-87D9-8F4C-A09A-8B86BA377156}"/>
+              </a:ext>
+            </a:extLst>
+          </p:cNvPr>
           <p:cNvPicPr>
             <a:picLocks noChangeAspect="1"/>
           </p:cNvPicPr>
           <p:nvPr/>
         </p:nvPicPr>
         <p:blipFill>
-          <a:blip r:embed="rId2"/>
-          <a:stretch>
-            <a:fillRect/>
-          </a:stretch>
+          <a:blip r:embed="rId12">
+            <a:extLst>
+              <a:ext uri="{96DAC541-7B7A-43D3-8B79-37D633B846F1}">
+                <asvg:svgBlip xmlns:asvg="http://schemas.microsoft.com/office/drawing/2016/SVG/main" xmlns="" r:embed="rId3"/>
+              </a:ext>
+            </a:extLst>
+          </a:blip>
+          <a:srcRect/>
+          <a:stretch/>
         </p:blipFill>
         <p:spPr>
           <a:xfrm>
-            <a:off x="1746021" y="2919046"/>
-            <a:ext cx="9807790" cy="2810467"/>
+            <a:off x="941690" y="1064326"/>
+            <a:ext cx="321358" cy="321358"/>
+          </a:xfrm>
+          <a:prstGeom prst="rect">
+            <a:avLst/>
+          </a:prstGeom>
+        </p:spPr>
+      </p:pic>
+      <p:sp>
+        <p:nvSpPr>
+          <p:cNvPr id="19" name="Rectangle 45">
+            <a:extLst>
+              <a:ext uri="{FF2B5EF4-FFF2-40B4-BE49-F238E27FC236}">
+                <a16:creationId xmlns:a16="http://schemas.microsoft.com/office/drawing/2014/main" id="{DE1D7014-BE11-C843-9F72-50FC09E9753B}"/>
+              </a:ext>
+            </a:extLst>
+          </p:cNvPr>
+          <p:cNvSpPr/>
+          <p:nvPr/>
+        </p:nvSpPr>
+        <p:spPr>
+          <a:xfrm>
+            <a:off x="941690" y="1064326"/>
+            <a:ext cx="4975532" cy="1132286"/>
+          </a:xfrm>
+          <a:prstGeom prst="rect">
+            <a:avLst/>
+          </a:prstGeom>
+          <a:noFill/>
+          <a:ln w="12700">
+            <a:solidFill>
+              <a:srgbClr val="FF9902"/>
+            </a:solidFill>
+          </a:ln>
+        </p:spPr>
+        <p:style>
+          <a:lnRef idx="2">
+            <a:schemeClr val="accent1">
+              <a:shade val="50000"/>
+            </a:schemeClr>
+          </a:lnRef>
+          <a:fillRef idx="1">
+            <a:schemeClr val="accent1"/>
+          </a:fillRef>
+          <a:effectRef idx="0">
+            <a:schemeClr val="accent1"/>
+          </a:effectRef>
+          <a:fontRef idx="minor">
+            <a:schemeClr val="lt1"/>
+          </a:fontRef>
+        </p:style>
+        <p:txBody>
+          <a:bodyPr lIns="502920" tIns="91440"/>
+          <a:lstStyle/>
+          <a:p>
+            <a:pPr algn="ctr" eaLnBrk="1" fontAlgn="auto" hangingPunct="1">
+              <a:spcBef>
+                <a:spcPts val="0"/>
+              </a:spcBef>
+              <a:spcAft>
+                <a:spcPts val="0"/>
+              </a:spcAft>
+              <a:defRPr/>
+            </a:pPr>
+            <a:r>
+              <a:rPr lang="en-US" sz="1000" dirty="0" smtClean="0">
+                <a:ln w="0"/>
+                <a:solidFill>
+                  <a:srgbClr val="FF9902"/>
+                </a:solidFill>
+                <a:latin typeface="Arial" panose="020B0604020202020204" pitchFamily="34" charset="0"/>
+                <a:cs typeface="Arial" panose="020B0604020202020204" pitchFamily="34" charset="0"/>
+              </a:rPr>
+              <a:t>Master(10.0.0.100)</a:t>
+            </a:r>
+            <a:endParaRPr lang="en-US" sz="1000" dirty="0">
+              <a:ln w="0"/>
+              <a:solidFill>
+                <a:srgbClr val="FF9902"/>
+              </a:solidFill>
+              <a:latin typeface="Arial" panose="020B0604020202020204" pitchFamily="34" charset="0"/>
+              <a:cs typeface="Arial" panose="020B0604020202020204" pitchFamily="34" charset="0"/>
+            </a:endParaRPr>
+          </a:p>
+        </p:txBody>
+      </p:sp>
+      <p:pic>
+        <p:nvPicPr>
+          <p:cNvPr id="20" name="Graphic 49">
+            <a:extLst>
+              <a:ext uri="{FF2B5EF4-FFF2-40B4-BE49-F238E27FC236}">
+                <a16:creationId xmlns:a16="http://schemas.microsoft.com/office/drawing/2014/main" id="{51695F39-87D9-8F4C-A09A-8B86BA377156}"/>
+              </a:ext>
+            </a:extLst>
+          </p:cNvPr>
+          <p:cNvPicPr>
+            <a:picLocks noChangeAspect="1"/>
+          </p:cNvPicPr>
+          <p:nvPr/>
+        </p:nvPicPr>
+        <p:blipFill>
+          <a:blip r:embed="rId12">
+            <a:extLst>
+              <a:ext uri="{96DAC541-7B7A-43D3-8B79-37D633B846F1}">
+                <asvg:svgBlip xmlns:asvg="http://schemas.microsoft.com/office/drawing/2016/SVG/main" xmlns="" r:embed="rId3"/>
+              </a:ext>
+            </a:extLst>
+          </a:blip>
+          <a:srcRect/>
+          <a:stretch/>
+        </p:blipFill>
+        <p:spPr>
+          <a:xfrm>
+            <a:off x="941690" y="4999987"/>
+            <a:ext cx="321358" cy="321358"/>
+          </a:xfrm>
+          <a:prstGeom prst="rect">
+            <a:avLst/>
+          </a:prstGeom>
+        </p:spPr>
+      </p:pic>
+      <p:sp>
+        <p:nvSpPr>
+          <p:cNvPr id="21" name="Rectangle 45">
+            <a:extLst>
+              <a:ext uri="{FF2B5EF4-FFF2-40B4-BE49-F238E27FC236}">
+                <a16:creationId xmlns:a16="http://schemas.microsoft.com/office/drawing/2014/main" id="{DE1D7014-BE11-C843-9F72-50FC09E9753B}"/>
+              </a:ext>
+            </a:extLst>
+          </p:cNvPr>
+          <p:cNvSpPr/>
+          <p:nvPr/>
+        </p:nvSpPr>
+        <p:spPr>
+          <a:xfrm>
+            <a:off x="941690" y="3739275"/>
+            <a:ext cx="4975532" cy="1132286"/>
+          </a:xfrm>
+          <a:prstGeom prst="rect">
+            <a:avLst/>
+          </a:prstGeom>
+          <a:noFill/>
+          <a:ln w="12700">
+            <a:solidFill>
+              <a:srgbClr val="FF9902"/>
+            </a:solidFill>
+          </a:ln>
+        </p:spPr>
+        <p:style>
+          <a:lnRef idx="2">
+            <a:schemeClr val="accent1">
+              <a:shade val="50000"/>
+            </a:schemeClr>
+          </a:lnRef>
+          <a:fillRef idx="1">
+            <a:schemeClr val="accent1"/>
+          </a:fillRef>
+          <a:effectRef idx="0">
+            <a:schemeClr val="accent1"/>
+          </a:effectRef>
+          <a:fontRef idx="minor">
+            <a:schemeClr val="lt1"/>
+          </a:fontRef>
+        </p:style>
+        <p:txBody>
+          <a:bodyPr lIns="502920" tIns="91440"/>
+          <a:lstStyle/>
+          <a:p>
+            <a:pPr algn="ctr" eaLnBrk="1" fontAlgn="auto" hangingPunct="1">
+              <a:spcBef>
+                <a:spcPts val="0"/>
+              </a:spcBef>
+              <a:spcAft>
+                <a:spcPts val="0"/>
+              </a:spcAft>
+              <a:defRPr/>
+            </a:pPr>
+            <a:r>
+              <a:rPr lang="en-US" sz="1000" dirty="0" smtClean="0">
+                <a:ln w="0"/>
+                <a:solidFill>
+                  <a:srgbClr val="FF9902"/>
+                </a:solidFill>
+                <a:latin typeface="Arial" panose="020B0604020202020204" pitchFamily="34" charset="0"/>
+                <a:cs typeface="Arial" panose="020B0604020202020204" pitchFamily="34" charset="0"/>
+              </a:rPr>
+              <a:t>Worker2(10.0.0.100)</a:t>
+            </a:r>
+            <a:endParaRPr lang="en-US" sz="1000" dirty="0">
+              <a:ln w="0"/>
+              <a:solidFill>
+                <a:srgbClr val="FF9902"/>
+              </a:solidFill>
+              <a:latin typeface="Arial" panose="020B0604020202020204" pitchFamily="34" charset="0"/>
+              <a:cs typeface="Arial" panose="020B0604020202020204" pitchFamily="34" charset="0"/>
+            </a:endParaRPr>
+          </a:p>
+        </p:txBody>
+      </p:sp>
+      <p:pic>
+        <p:nvPicPr>
+          <p:cNvPr id="22" name="Graphic 49">
+            <a:extLst>
+              <a:ext uri="{FF2B5EF4-FFF2-40B4-BE49-F238E27FC236}">
+                <a16:creationId xmlns:a16="http://schemas.microsoft.com/office/drawing/2014/main" id="{51695F39-87D9-8F4C-A09A-8B86BA377156}"/>
+              </a:ext>
+            </a:extLst>
+          </p:cNvPr>
+          <p:cNvPicPr>
+            <a:picLocks noChangeAspect="1"/>
+          </p:cNvPicPr>
+          <p:nvPr/>
+        </p:nvPicPr>
+        <p:blipFill>
+          <a:blip r:embed="rId12">
+            <a:extLst>
+              <a:ext uri="{96DAC541-7B7A-43D3-8B79-37D633B846F1}">
+                <asvg:svgBlip xmlns:asvg="http://schemas.microsoft.com/office/drawing/2016/SVG/main" xmlns="" r:embed="rId3"/>
+              </a:ext>
+            </a:extLst>
+          </a:blip>
+          <a:srcRect/>
+          <a:stretch/>
+        </p:blipFill>
+        <p:spPr>
+          <a:xfrm>
+            <a:off x="941690" y="3746060"/>
+            <a:ext cx="321358" cy="321358"/>
+          </a:xfrm>
+          <a:prstGeom prst="rect">
+            <a:avLst/>
+          </a:prstGeom>
+        </p:spPr>
+      </p:pic>
+      <p:sp>
+        <p:nvSpPr>
+          <p:cNvPr id="23" name="Rectangle 45">
+            <a:extLst>
+              <a:ext uri="{FF2B5EF4-FFF2-40B4-BE49-F238E27FC236}">
+                <a16:creationId xmlns:a16="http://schemas.microsoft.com/office/drawing/2014/main" id="{DE1D7014-BE11-C843-9F72-50FC09E9753B}"/>
+              </a:ext>
+            </a:extLst>
+          </p:cNvPr>
+          <p:cNvSpPr/>
+          <p:nvPr/>
+        </p:nvSpPr>
+        <p:spPr>
+          <a:xfrm>
+            <a:off x="941690" y="2401800"/>
+            <a:ext cx="4975532" cy="1132286"/>
+          </a:xfrm>
+          <a:prstGeom prst="rect">
+            <a:avLst/>
+          </a:prstGeom>
+          <a:noFill/>
+          <a:ln w="12700">
+            <a:solidFill>
+              <a:srgbClr val="FF9902"/>
+            </a:solidFill>
+          </a:ln>
+        </p:spPr>
+        <p:style>
+          <a:lnRef idx="2">
+            <a:schemeClr val="accent1">
+              <a:shade val="50000"/>
+            </a:schemeClr>
+          </a:lnRef>
+          <a:fillRef idx="1">
+            <a:schemeClr val="accent1"/>
+          </a:fillRef>
+          <a:effectRef idx="0">
+            <a:schemeClr val="accent1"/>
+          </a:effectRef>
+          <a:fontRef idx="minor">
+            <a:schemeClr val="lt1"/>
+          </a:fontRef>
+        </p:style>
+        <p:txBody>
+          <a:bodyPr lIns="502920" tIns="91440"/>
+          <a:lstStyle/>
+          <a:p>
+            <a:pPr algn="ctr" eaLnBrk="1" fontAlgn="auto" hangingPunct="1">
+              <a:spcBef>
+                <a:spcPts val="0"/>
+              </a:spcBef>
+              <a:spcAft>
+                <a:spcPts val="0"/>
+              </a:spcAft>
+              <a:defRPr/>
+            </a:pPr>
+            <a:r>
+              <a:rPr lang="en-US" sz="1000" dirty="0" smtClean="0">
+                <a:ln w="0"/>
+                <a:solidFill>
+                  <a:srgbClr val="FF9902"/>
+                </a:solidFill>
+                <a:latin typeface="Arial" panose="020B0604020202020204" pitchFamily="34" charset="0"/>
+                <a:cs typeface="Arial" panose="020B0604020202020204" pitchFamily="34" charset="0"/>
+              </a:rPr>
+              <a:t>Worker1(10.0.0.100)</a:t>
+            </a:r>
+            <a:endParaRPr lang="en-US" sz="1000" dirty="0">
+              <a:ln w="0"/>
+              <a:solidFill>
+                <a:srgbClr val="FF9902"/>
+              </a:solidFill>
+              <a:latin typeface="Arial" panose="020B0604020202020204" pitchFamily="34" charset="0"/>
+              <a:cs typeface="Arial" panose="020B0604020202020204" pitchFamily="34" charset="0"/>
+            </a:endParaRPr>
+          </a:p>
+        </p:txBody>
+      </p:sp>
+      <p:pic>
+        <p:nvPicPr>
+          <p:cNvPr id="24" name="Graphic 49">
+            <a:extLst>
+              <a:ext uri="{FF2B5EF4-FFF2-40B4-BE49-F238E27FC236}">
+                <a16:creationId xmlns:a16="http://schemas.microsoft.com/office/drawing/2014/main" id="{51695F39-87D9-8F4C-A09A-8B86BA377156}"/>
+              </a:ext>
+            </a:extLst>
+          </p:cNvPr>
+          <p:cNvPicPr>
+            <a:picLocks noChangeAspect="1"/>
+          </p:cNvPicPr>
+          <p:nvPr/>
+        </p:nvPicPr>
+        <p:blipFill>
+          <a:blip r:embed="rId12">
+            <a:extLst>
+              <a:ext uri="{96DAC541-7B7A-43D3-8B79-37D633B846F1}">
+                <asvg:svgBlip xmlns:asvg="http://schemas.microsoft.com/office/drawing/2016/SVG/main" xmlns="" r:embed="rId3"/>
+              </a:ext>
+            </a:extLst>
+          </a:blip>
+          <a:srcRect/>
+          <a:stretch/>
+        </p:blipFill>
+        <p:spPr>
+          <a:xfrm>
+            <a:off x="941690" y="2424884"/>
+            <a:ext cx="321358" cy="321358"/>
           </a:xfrm>
           <a:prstGeom prst="rect">
             <a:avLst/>
@@ -3563,7 +3884,7 @@
     </p:spTree>
     <p:extLst>
       <p:ext uri="{BB962C8B-B14F-4D97-AF65-F5344CB8AC3E}">
-        <p14:creationId xmlns:p14="http://schemas.microsoft.com/office/powerpoint/2010/main" val="926854799"/>
+        <p14:creationId xmlns:p14="http://schemas.microsoft.com/office/powerpoint/2010/main" val="3182543127"/>
       </p:ext>
     </p:extLst>
   </p:cSld>
@@ -3597,28 +3918,9 @@
           <a:chExt cx="0" cy="0"/>
         </a:xfrm>
       </p:grpSpPr>
-      <p:sp>
-        <p:nvSpPr>
-          <p:cNvPr id="2" name="제목 1"/>
-          <p:cNvSpPr>
-            <a:spLocks noGrp="1"/>
-          </p:cNvSpPr>
-          <p:nvPr>
-            <p:ph type="title"/>
-          </p:nvPr>
-        </p:nvSpPr>
-        <p:spPr/>
-        <p:txBody>
-          <a:bodyPr/>
-          <a:lstStyle/>
-          <a:p>
-            <a:endParaRPr lang="ko-KR" altLang="en-US"/>
-          </a:p>
-        </p:txBody>
-      </p:sp>
       <p:pic>
         <p:nvPicPr>
-          <p:cNvPr id="4" name="그림 3"/>
+          <p:cNvPr id="8" name="그림 7"/>
           <p:cNvPicPr>
             <a:picLocks noChangeAspect="1"/>
           </p:cNvPicPr>
@@ -3632,8 +3934,8 @@
         </p:blipFill>
         <p:spPr>
           <a:xfrm>
-            <a:off x="1192105" y="2972902"/>
-            <a:ext cx="9807790" cy="1615580"/>
+            <a:off x="720969" y="685799"/>
+            <a:ext cx="10594731" cy="5336932"/>
           </a:xfrm>
           <a:prstGeom prst="rect">
             <a:avLst/>
@@ -3642,35 +3944,237 @@
       </p:pic>
       <p:sp>
         <p:nvSpPr>
-          <p:cNvPr id="5" name="TextBox 4"/>
-          <p:cNvSpPr txBox="1"/>
+          <p:cNvPr id="10" name="Subtitle 5">
+            <a:extLst>
+              <a:ext uri="{FF2B5EF4-FFF2-40B4-BE49-F238E27FC236}">
+                <a16:creationId xmlns:a16="http://schemas.microsoft.com/office/drawing/2014/main" id="{D1E73EEA-03FA-8F40-9442-4B1A82AAC151}"/>
+              </a:ext>
+            </a:extLst>
+          </p:cNvPr>
+          <p:cNvSpPr txBox="1">
+            <a:spLocks/>
+          </p:cNvSpPr>
           <p:nvPr/>
         </p:nvSpPr>
         <p:spPr>
           <a:xfrm>
-            <a:off x="5224096" y="2462893"/>
-            <a:ext cx="871904" cy="369332"/>
+            <a:off x="0" y="148070"/>
+            <a:ext cx="4852867" cy="537729"/>
           </a:xfrm>
           <a:prstGeom prst="rect">
             <a:avLst/>
           </a:prstGeom>
-          <a:noFill/>
         </p:spPr>
         <p:txBody>
-          <a:bodyPr wrap="square" rtlCol="0">
-            <a:spAutoFit/>
+          <a:bodyPr vert="horz" lIns="91440" tIns="45720" rIns="91440" bIns="45720" rtlCol="0">
+            <a:noAutofit/>
           </a:bodyPr>
-          <a:lstStyle/>
-          <a:p>
-            <a:r>
-              <a:rPr lang="en-US" altLang="ko-KR" dirty="0" smtClean="0">
+          <a:lstStyle>
+            <a:lvl1pPr marL="228600" indent="-228600" algn="l" defTabSz="914400" rtl="0" eaLnBrk="1" latinLnBrk="1" hangingPunct="1">
+              <a:lnSpc>
+                <a:spcPct val="90000"/>
+              </a:lnSpc>
+              <a:spcBef>
+                <a:spcPts val="1000"/>
+              </a:spcBef>
+              <a:buFont typeface="Arial" panose="020B0604020202020204" pitchFamily="34" charset="0"/>
+              <a:buChar char="•"/>
+              <a:defRPr sz="2800" kern="1200">
+                <a:solidFill>
+                  <a:schemeClr val="tx1"/>
+                </a:solidFill>
+                <a:latin typeface="+mn-lt"/>
+                <a:ea typeface="+mn-ea"/>
+                <a:cs typeface="+mn-cs"/>
+              </a:defRPr>
+            </a:lvl1pPr>
+            <a:lvl2pPr marL="685800" indent="-228600" algn="l" defTabSz="914400" rtl="0" eaLnBrk="1" latinLnBrk="1" hangingPunct="1">
+              <a:lnSpc>
+                <a:spcPct val="90000"/>
+              </a:lnSpc>
+              <a:spcBef>
+                <a:spcPts val="500"/>
+              </a:spcBef>
+              <a:buFont typeface="Arial" panose="020B0604020202020204" pitchFamily="34" charset="0"/>
+              <a:buChar char="•"/>
+              <a:defRPr sz="2400" kern="1200">
+                <a:solidFill>
+                  <a:schemeClr val="tx1"/>
+                </a:solidFill>
+                <a:latin typeface="+mn-lt"/>
+                <a:ea typeface="+mn-ea"/>
+                <a:cs typeface="+mn-cs"/>
+              </a:defRPr>
+            </a:lvl2pPr>
+            <a:lvl3pPr marL="1143000" indent="-228600" algn="l" defTabSz="914400" rtl="0" eaLnBrk="1" latinLnBrk="1" hangingPunct="1">
+              <a:lnSpc>
+                <a:spcPct val="90000"/>
+              </a:lnSpc>
+              <a:spcBef>
+                <a:spcPts val="500"/>
+              </a:spcBef>
+              <a:buFont typeface="Arial" panose="020B0604020202020204" pitchFamily="34" charset="0"/>
+              <a:buChar char="•"/>
+              <a:defRPr sz="2000" kern="1200">
+                <a:solidFill>
+                  <a:schemeClr val="tx1"/>
+                </a:solidFill>
+                <a:latin typeface="+mn-lt"/>
+                <a:ea typeface="+mn-ea"/>
+                <a:cs typeface="+mn-cs"/>
+              </a:defRPr>
+            </a:lvl3pPr>
+            <a:lvl4pPr marL="1600200" indent="-228600" algn="l" defTabSz="914400" rtl="0" eaLnBrk="1" latinLnBrk="1" hangingPunct="1">
+              <a:lnSpc>
+                <a:spcPct val="90000"/>
+              </a:lnSpc>
+              <a:spcBef>
+                <a:spcPts val="500"/>
+              </a:spcBef>
+              <a:buFont typeface="Arial" panose="020B0604020202020204" pitchFamily="34" charset="0"/>
+              <a:buChar char="•"/>
+              <a:defRPr sz="1800" kern="1200">
+                <a:solidFill>
+                  <a:schemeClr val="tx1"/>
+                </a:solidFill>
+                <a:latin typeface="+mn-lt"/>
+                <a:ea typeface="+mn-ea"/>
+                <a:cs typeface="+mn-cs"/>
+              </a:defRPr>
+            </a:lvl4pPr>
+            <a:lvl5pPr marL="2057400" indent="-228600" algn="l" defTabSz="914400" rtl="0" eaLnBrk="1" latinLnBrk="1" hangingPunct="1">
+              <a:lnSpc>
+                <a:spcPct val="90000"/>
+              </a:lnSpc>
+              <a:spcBef>
+                <a:spcPts val="500"/>
+              </a:spcBef>
+              <a:buFont typeface="Arial" panose="020B0604020202020204" pitchFamily="34" charset="0"/>
+              <a:buChar char="•"/>
+              <a:defRPr sz="1800" kern="1200">
+                <a:solidFill>
+                  <a:schemeClr val="tx1"/>
+                </a:solidFill>
+                <a:latin typeface="+mn-lt"/>
+                <a:ea typeface="+mn-ea"/>
+                <a:cs typeface="+mn-cs"/>
+              </a:defRPr>
+            </a:lvl5pPr>
+            <a:lvl6pPr marL="2514600" indent="-228600" algn="l" defTabSz="914400" rtl="0" eaLnBrk="1" latinLnBrk="1" hangingPunct="1">
+              <a:lnSpc>
+                <a:spcPct val="90000"/>
+              </a:lnSpc>
+              <a:spcBef>
+                <a:spcPts val="500"/>
+              </a:spcBef>
+              <a:buFont typeface="Arial" panose="020B0604020202020204" pitchFamily="34" charset="0"/>
+              <a:buChar char="•"/>
+              <a:defRPr sz="1800" kern="1200">
+                <a:solidFill>
+                  <a:schemeClr val="tx1"/>
+                </a:solidFill>
+                <a:latin typeface="+mn-lt"/>
+                <a:ea typeface="+mn-ea"/>
+                <a:cs typeface="+mn-cs"/>
+              </a:defRPr>
+            </a:lvl6pPr>
+            <a:lvl7pPr marL="2971800" indent="-228600" algn="l" defTabSz="914400" rtl="0" eaLnBrk="1" latinLnBrk="1" hangingPunct="1">
+              <a:lnSpc>
+                <a:spcPct val="90000"/>
+              </a:lnSpc>
+              <a:spcBef>
+                <a:spcPts val="500"/>
+              </a:spcBef>
+              <a:buFont typeface="Arial" panose="020B0604020202020204" pitchFamily="34" charset="0"/>
+              <a:buChar char="•"/>
+              <a:defRPr sz="1800" kern="1200">
+                <a:solidFill>
+                  <a:schemeClr val="tx1"/>
+                </a:solidFill>
+                <a:latin typeface="+mn-lt"/>
+                <a:ea typeface="+mn-ea"/>
+                <a:cs typeface="+mn-cs"/>
+              </a:defRPr>
+            </a:lvl7pPr>
+            <a:lvl8pPr marL="3429000" indent="-228600" algn="l" defTabSz="914400" rtl="0" eaLnBrk="1" latinLnBrk="1" hangingPunct="1">
+              <a:lnSpc>
+                <a:spcPct val="90000"/>
+              </a:lnSpc>
+              <a:spcBef>
+                <a:spcPts val="500"/>
+              </a:spcBef>
+              <a:buFont typeface="Arial" panose="020B0604020202020204" pitchFamily="34" charset="0"/>
+              <a:buChar char="•"/>
+              <a:defRPr sz="1800" kern="1200">
+                <a:solidFill>
+                  <a:schemeClr val="tx1"/>
+                </a:solidFill>
+                <a:latin typeface="+mn-lt"/>
+                <a:ea typeface="+mn-ea"/>
+                <a:cs typeface="+mn-cs"/>
+              </a:defRPr>
+            </a:lvl8pPr>
+            <a:lvl9pPr marL="3886200" indent="-228600" algn="l" defTabSz="914400" rtl="0" eaLnBrk="1" latinLnBrk="1" hangingPunct="1">
+              <a:lnSpc>
+                <a:spcPct val="90000"/>
+              </a:lnSpc>
+              <a:spcBef>
+                <a:spcPts val="500"/>
+              </a:spcBef>
+              <a:buFont typeface="Arial" panose="020B0604020202020204" pitchFamily="34" charset="0"/>
+              <a:buChar char="•"/>
+              <a:defRPr sz="1800" kern="1200">
+                <a:solidFill>
+                  <a:schemeClr val="tx1"/>
+                </a:solidFill>
+                <a:latin typeface="+mn-lt"/>
+                <a:ea typeface="+mn-ea"/>
+                <a:cs typeface="+mn-cs"/>
+              </a:defRPr>
+            </a:lvl9pPr>
+          </a:lstStyle>
+          <a:p>
+            <a:pPr marL="0" indent="0">
+              <a:buNone/>
+              <a:defRPr/>
+            </a:pPr>
+            <a:r>
+              <a:rPr lang="en-US" altLang="ko-KR" sz="2400" dirty="0" smtClean="0">
+                <a:solidFill>
+                  <a:srgbClr val="FFC000"/>
+                </a:solidFill>
+              </a:rPr>
+              <a:t>Cloud Formation</a:t>
+            </a:r>
+            <a:r>
+              <a:rPr lang="en-US" altLang="ko-KR" sz="2400" dirty="0" smtClean="0"/>
+              <a:t> </a:t>
+            </a:r>
+            <a:r>
+              <a:rPr lang="en-US" altLang="ko-KR" sz="2400" dirty="0" smtClean="0">
                 <a:solidFill>
                   <a:srgbClr val="FF0000"/>
                 </a:solidFill>
               </a:rPr>
-              <a:t>Worker</a:t>
-            </a:r>
-            <a:endParaRPr lang="ko-KR" altLang="en-US" dirty="0">
+              <a:t>Master’s </a:t>
+            </a:r>
+            <a:r>
+              <a:rPr lang="en-US" altLang="ko-KR" sz="2400" dirty="0">
+                <a:solidFill>
+                  <a:srgbClr val="FF0000"/>
+                </a:solidFill>
+              </a:rPr>
+              <a:t>User </a:t>
+            </a:r>
+            <a:r>
+              <a:rPr lang="en-US" altLang="ko-KR" sz="2400" dirty="0" smtClean="0">
+                <a:solidFill>
+                  <a:srgbClr val="FF0000"/>
+                </a:solidFill>
+              </a:rPr>
+              <a:t>data</a:t>
+            </a:r>
+            <a:endParaRPr lang="en-US" sz="2400" dirty="0">
               <a:solidFill>
                 <a:srgbClr val="FF0000"/>
               </a:solidFill>
@@ -3678,6 +4182,535 @@
           </a:p>
         </p:txBody>
       </p:sp>
+      <p:cxnSp>
+        <p:nvCxnSpPr>
+          <p:cNvPr id="19" name="직선 연결선 18"/>
+          <p:cNvCxnSpPr/>
+          <p:nvPr/>
+        </p:nvCxnSpPr>
+        <p:spPr>
+          <a:xfrm>
+            <a:off x="4686300" y="378069"/>
+            <a:ext cx="7505700" cy="0"/>
+          </a:xfrm>
+          <a:prstGeom prst="line">
+            <a:avLst/>
+          </a:prstGeom>
+        </p:spPr>
+        <p:style>
+          <a:lnRef idx="2">
+            <a:schemeClr val="accent5"/>
+          </a:lnRef>
+          <a:fillRef idx="0">
+            <a:schemeClr val="accent5"/>
+          </a:fillRef>
+          <a:effectRef idx="1">
+            <a:schemeClr val="accent5"/>
+          </a:effectRef>
+          <a:fontRef idx="minor">
+            <a:schemeClr val="tx1"/>
+          </a:fontRef>
+        </p:style>
+      </p:cxnSp>
+      <p:cxnSp>
+        <p:nvCxnSpPr>
+          <p:cNvPr id="21" name="직선 연결선 20"/>
+          <p:cNvCxnSpPr/>
+          <p:nvPr/>
+        </p:nvCxnSpPr>
+        <p:spPr>
+          <a:xfrm>
+            <a:off x="11614638" y="378069"/>
+            <a:ext cx="0" cy="6479931"/>
+          </a:xfrm>
+          <a:prstGeom prst="line">
+            <a:avLst/>
+          </a:prstGeom>
+        </p:spPr>
+        <p:style>
+          <a:lnRef idx="1">
+            <a:schemeClr val="accent1"/>
+          </a:lnRef>
+          <a:fillRef idx="0">
+            <a:schemeClr val="accent1"/>
+          </a:fillRef>
+          <a:effectRef idx="0">
+            <a:schemeClr val="accent1"/>
+          </a:effectRef>
+          <a:fontRef idx="minor">
+            <a:schemeClr val="tx1"/>
+          </a:fontRef>
+        </p:style>
+      </p:cxnSp>
+      <p:cxnSp>
+        <p:nvCxnSpPr>
+          <p:cNvPr id="23" name="직선 연결선 22"/>
+          <p:cNvCxnSpPr/>
+          <p:nvPr/>
+        </p:nvCxnSpPr>
+        <p:spPr>
+          <a:xfrm flipH="1">
+            <a:off x="0" y="6277708"/>
+            <a:ext cx="11614639" cy="0"/>
+          </a:xfrm>
+          <a:prstGeom prst="line">
+            <a:avLst/>
+          </a:prstGeom>
+        </p:spPr>
+        <p:style>
+          <a:lnRef idx="1">
+            <a:schemeClr val="accent1"/>
+          </a:lnRef>
+          <a:fillRef idx="0">
+            <a:schemeClr val="accent1"/>
+          </a:fillRef>
+          <a:effectRef idx="0">
+            <a:schemeClr val="accent1"/>
+          </a:effectRef>
+          <a:fontRef idx="minor">
+            <a:schemeClr val="tx1"/>
+          </a:fontRef>
+        </p:style>
+      </p:cxnSp>
+      <p:cxnSp>
+        <p:nvCxnSpPr>
+          <p:cNvPr id="25" name="직선 연결선 24"/>
+          <p:cNvCxnSpPr/>
+          <p:nvPr/>
+        </p:nvCxnSpPr>
+        <p:spPr>
+          <a:xfrm>
+            <a:off x="422031" y="501162"/>
+            <a:ext cx="0" cy="5776546"/>
+          </a:xfrm>
+          <a:prstGeom prst="line">
+            <a:avLst/>
+          </a:prstGeom>
+        </p:spPr>
+        <p:style>
+          <a:lnRef idx="1">
+            <a:schemeClr val="accent1"/>
+          </a:lnRef>
+          <a:fillRef idx="0">
+            <a:schemeClr val="accent1"/>
+          </a:fillRef>
+          <a:effectRef idx="0">
+            <a:schemeClr val="accent1"/>
+          </a:effectRef>
+          <a:fontRef idx="minor">
+            <a:schemeClr val="tx1"/>
+          </a:fontRef>
+        </p:style>
+      </p:cxnSp>
+    </p:spTree>
+    <p:extLst>
+      <p:ext uri="{BB962C8B-B14F-4D97-AF65-F5344CB8AC3E}">
+        <p14:creationId xmlns:p14="http://schemas.microsoft.com/office/powerpoint/2010/main" val="926854799"/>
+      </p:ext>
+    </p:extLst>
+  </p:cSld>
+  <p:clrMapOvr>
+    <a:masterClrMapping/>
+  </p:clrMapOvr>
+  <p:timing>
+    <p:tnLst>
+      <p:par>
+        <p:cTn id="1" dur="indefinite" restart="never" nodeType="tmRoot"/>
+      </p:par>
+    </p:tnLst>
+  </p:timing>
+</p:sld>
+</file>
+
+<file path=ppt/slides/slide5.xml><?xml version="1.0" encoding="utf-8"?>
+<p:sld xmlns:a="http://schemas.openxmlformats.org/drawingml/2006/main" xmlns:r="http://schemas.openxmlformats.org/officeDocument/2006/relationships" xmlns:p="http://schemas.openxmlformats.org/presentationml/2006/main">
+  <p:cSld>
+    <p:spTree>
+      <p:nvGrpSpPr>
+        <p:cNvPr id="1" name=""/>
+        <p:cNvGrpSpPr/>
+        <p:nvPr/>
+      </p:nvGrpSpPr>
+      <p:grpSpPr>
+        <a:xfrm>
+          <a:off x="0" y="0"/>
+          <a:ext cx="0" cy="0"/>
+          <a:chOff x="0" y="0"/>
+          <a:chExt cx="0" cy="0"/>
+        </a:xfrm>
+      </p:grpSpPr>
+      <p:sp>
+        <p:nvSpPr>
+          <p:cNvPr id="14" name="Subtitle 5">
+            <a:extLst>
+              <a:ext uri="{FF2B5EF4-FFF2-40B4-BE49-F238E27FC236}">
+                <a16:creationId xmlns:a16="http://schemas.microsoft.com/office/drawing/2014/main" id="{D1E73EEA-03FA-8F40-9442-4B1A82AAC151}"/>
+              </a:ext>
+            </a:extLst>
+          </p:cNvPr>
+          <p:cNvSpPr txBox="1">
+            <a:spLocks/>
+          </p:cNvSpPr>
+          <p:nvPr/>
+        </p:nvSpPr>
+        <p:spPr>
+          <a:xfrm>
+            <a:off x="0" y="148070"/>
+            <a:ext cx="4852867" cy="537729"/>
+          </a:xfrm>
+          <a:prstGeom prst="rect">
+            <a:avLst/>
+          </a:prstGeom>
+        </p:spPr>
+        <p:txBody>
+          <a:bodyPr vert="horz" lIns="91440" tIns="45720" rIns="91440" bIns="45720" rtlCol="0">
+            <a:noAutofit/>
+          </a:bodyPr>
+          <a:lstStyle>
+            <a:lvl1pPr marL="228600" indent="-228600" algn="l" defTabSz="914400" rtl="0" eaLnBrk="1" latinLnBrk="1" hangingPunct="1">
+              <a:lnSpc>
+                <a:spcPct val="90000"/>
+              </a:lnSpc>
+              <a:spcBef>
+                <a:spcPts val="1000"/>
+              </a:spcBef>
+              <a:buFont typeface="Arial" panose="020B0604020202020204" pitchFamily="34" charset="0"/>
+              <a:buChar char="•"/>
+              <a:defRPr sz="2800" kern="1200">
+                <a:solidFill>
+                  <a:schemeClr val="tx1"/>
+                </a:solidFill>
+                <a:latin typeface="+mn-lt"/>
+                <a:ea typeface="+mn-ea"/>
+                <a:cs typeface="+mn-cs"/>
+              </a:defRPr>
+            </a:lvl1pPr>
+            <a:lvl2pPr marL="685800" indent="-228600" algn="l" defTabSz="914400" rtl="0" eaLnBrk="1" latinLnBrk="1" hangingPunct="1">
+              <a:lnSpc>
+                <a:spcPct val="90000"/>
+              </a:lnSpc>
+              <a:spcBef>
+                <a:spcPts val="500"/>
+              </a:spcBef>
+              <a:buFont typeface="Arial" panose="020B0604020202020204" pitchFamily="34" charset="0"/>
+              <a:buChar char="•"/>
+              <a:defRPr sz="2400" kern="1200">
+                <a:solidFill>
+                  <a:schemeClr val="tx1"/>
+                </a:solidFill>
+                <a:latin typeface="+mn-lt"/>
+                <a:ea typeface="+mn-ea"/>
+                <a:cs typeface="+mn-cs"/>
+              </a:defRPr>
+            </a:lvl2pPr>
+            <a:lvl3pPr marL="1143000" indent="-228600" algn="l" defTabSz="914400" rtl="0" eaLnBrk="1" latinLnBrk="1" hangingPunct="1">
+              <a:lnSpc>
+                <a:spcPct val="90000"/>
+              </a:lnSpc>
+              <a:spcBef>
+                <a:spcPts val="500"/>
+              </a:spcBef>
+              <a:buFont typeface="Arial" panose="020B0604020202020204" pitchFamily="34" charset="0"/>
+              <a:buChar char="•"/>
+              <a:defRPr sz="2000" kern="1200">
+                <a:solidFill>
+                  <a:schemeClr val="tx1"/>
+                </a:solidFill>
+                <a:latin typeface="+mn-lt"/>
+                <a:ea typeface="+mn-ea"/>
+                <a:cs typeface="+mn-cs"/>
+              </a:defRPr>
+            </a:lvl3pPr>
+            <a:lvl4pPr marL="1600200" indent="-228600" algn="l" defTabSz="914400" rtl="0" eaLnBrk="1" latinLnBrk="1" hangingPunct="1">
+              <a:lnSpc>
+                <a:spcPct val="90000"/>
+              </a:lnSpc>
+              <a:spcBef>
+                <a:spcPts val="500"/>
+              </a:spcBef>
+              <a:buFont typeface="Arial" panose="020B0604020202020204" pitchFamily="34" charset="0"/>
+              <a:buChar char="•"/>
+              <a:defRPr sz="1800" kern="1200">
+                <a:solidFill>
+                  <a:schemeClr val="tx1"/>
+                </a:solidFill>
+                <a:latin typeface="+mn-lt"/>
+                <a:ea typeface="+mn-ea"/>
+                <a:cs typeface="+mn-cs"/>
+              </a:defRPr>
+            </a:lvl4pPr>
+            <a:lvl5pPr marL="2057400" indent="-228600" algn="l" defTabSz="914400" rtl="0" eaLnBrk="1" latinLnBrk="1" hangingPunct="1">
+              <a:lnSpc>
+                <a:spcPct val="90000"/>
+              </a:lnSpc>
+              <a:spcBef>
+                <a:spcPts val="500"/>
+              </a:spcBef>
+              <a:buFont typeface="Arial" panose="020B0604020202020204" pitchFamily="34" charset="0"/>
+              <a:buChar char="•"/>
+              <a:defRPr sz="1800" kern="1200">
+                <a:solidFill>
+                  <a:schemeClr val="tx1"/>
+                </a:solidFill>
+                <a:latin typeface="+mn-lt"/>
+                <a:ea typeface="+mn-ea"/>
+                <a:cs typeface="+mn-cs"/>
+              </a:defRPr>
+            </a:lvl5pPr>
+            <a:lvl6pPr marL="2514600" indent="-228600" algn="l" defTabSz="914400" rtl="0" eaLnBrk="1" latinLnBrk="1" hangingPunct="1">
+              <a:lnSpc>
+                <a:spcPct val="90000"/>
+              </a:lnSpc>
+              <a:spcBef>
+                <a:spcPts val="500"/>
+              </a:spcBef>
+              <a:buFont typeface="Arial" panose="020B0604020202020204" pitchFamily="34" charset="0"/>
+              <a:buChar char="•"/>
+              <a:defRPr sz="1800" kern="1200">
+                <a:solidFill>
+                  <a:schemeClr val="tx1"/>
+                </a:solidFill>
+                <a:latin typeface="+mn-lt"/>
+                <a:ea typeface="+mn-ea"/>
+                <a:cs typeface="+mn-cs"/>
+              </a:defRPr>
+            </a:lvl6pPr>
+            <a:lvl7pPr marL="2971800" indent="-228600" algn="l" defTabSz="914400" rtl="0" eaLnBrk="1" latinLnBrk="1" hangingPunct="1">
+              <a:lnSpc>
+                <a:spcPct val="90000"/>
+              </a:lnSpc>
+              <a:spcBef>
+                <a:spcPts val="500"/>
+              </a:spcBef>
+              <a:buFont typeface="Arial" panose="020B0604020202020204" pitchFamily="34" charset="0"/>
+              <a:buChar char="•"/>
+              <a:defRPr sz="1800" kern="1200">
+                <a:solidFill>
+                  <a:schemeClr val="tx1"/>
+                </a:solidFill>
+                <a:latin typeface="+mn-lt"/>
+                <a:ea typeface="+mn-ea"/>
+                <a:cs typeface="+mn-cs"/>
+              </a:defRPr>
+            </a:lvl7pPr>
+            <a:lvl8pPr marL="3429000" indent="-228600" algn="l" defTabSz="914400" rtl="0" eaLnBrk="1" latinLnBrk="1" hangingPunct="1">
+              <a:lnSpc>
+                <a:spcPct val="90000"/>
+              </a:lnSpc>
+              <a:spcBef>
+                <a:spcPts val="500"/>
+              </a:spcBef>
+              <a:buFont typeface="Arial" panose="020B0604020202020204" pitchFamily="34" charset="0"/>
+              <a:buChar char="•"/>
+              <a:defRPr sz="1800" kern="1200">
+                <a:solidFill>
+                  <a:schemeClr val="tx1"/>
+                </a:solidFill>
+                <a:latin typeface="+mn-lt"/>
+                <a:ea typeface="+mn-ea"/>
+                <a:cs typeface="+mn-cs"/>
+              </a:defRPr>
+            </a:lvl8pPr>
+            <a:lvl9pPr marL="3886200" indent="-228600" algn="l" defTabSz="914400" rtl="0" eaLnBrk="1" latinLnBrk="1" hangingPunct="1">
+              <a:lnSpc>
+                <a:spcPct val="90000"/>
+              </a:lnSpc>
+              <a:spcBef>
+                <a:spcPts val="500"/>
+              </a:spcBef>
+              <a:buFont typeface="Arial" panose="020B0604020202020204" pitchFamily="34" charset="0"/>
+              <a:buChar char="•"/>
+              <a:defRPr sz="1800" kern="1200">
+                <a:solidFill>
+                  <a:schemeClr val="tx1"/>
+                </a:solidFill>
+                <a:latin typeface="+mn-lt"/>
+                <a:ea typeface="+mn-ea"/>
+                <a:cs typeface="+mn-cs"/>
+              </a:defRPr>
+            </a:lvl9pPr>
+          </a:lstStyle>
+          <a:p>
+            <a:pPr marL="0" indent="0">
+              <a:buNone/>
+              <a:defRPr/>
+            </a:pPr>
+            <a:r>
+              <a:rPr lang="en-US" altLang="ko-KR" sz="2400" dirty="0" smtClean="0">
+                <a:solidFill>
+                  <a:srgbClr val="FFC000"/>
+                </a:solidFill>
+              </a:rPr>
+              <a:t>Cloud </a:t>
+            </a:r>
+            <a:r>
+              <a:rPr lang="en-US" altLang="ko-KR" sz="2400" dirty="0">
+                <a:solidFill>
+                  <a:srgbClr val="FFC000"/>
+                </a:solidFill>
+              </a:rPr>
+              <a:t>Formation</a:t>
+            </a:r>
+            <a:r>
+              <a:rPr lang="en-US" altLang="ko-KR" sz="2400" dirty="0"/>
+              <a:t> </a:t>
+            </a:r>
+            <a:r>
+              <a:rPr lang="en-US" altLang="ko-KR" sz="2400" dirty="0" smtClean="0"/>
+              <a:t> </a:t>
+            </a:r>
+            <a:r>
+              <a:rPr lang="en-US" altLang="ko-KR" sz="2400" dirty="0" smtClean="0">
+                <a:solidFill>
+                  <a:srgbClr val="FF0000"/>
+                </a:solidFill>
+              </a:rPr>
+              <a:t>Worker’s </a:t>
+            </a:r>
+            <a:r>
+              <a:rPr lang="en-US" altLang="ko-KR" sz="2400" dirty="0">
+                <a:solidFill>
+                  <a:srgbClr val="FF0000"/>
+                </a:solidFill>
+              </a:rPr>
+              <a:t>User </a:t>
+            </a:r>
+            <a:r>
+              <a:rPr lang="en-US" altLang="ko-KR" sz="2400" dirty="0" smtClean="0">
+                <a:solidFill>
+                  <a:srgbClr val="FF0000"/>
+                </a:solidFill>
+              </a:rPr>
+              <a:t>data</a:t>
+            </a:r>
+            <a:endParaRPr lang="en-US" sz="2400" dirty="0">
+              <a:solidFill>
+                <a:srgbClr val="FF0000"/>
+              </a:solidFill>
+            </a:endParaRPr>
+          </a:p>
+        </p:txBody>
+      </p:sp>
+      <p:cxnSp>
+        <p:nvCxnSpPr>
+          <p:cNvPr id="15" name="직선 연결선 14"/>
+          <p:cNvCxnSpPr/>
+          <p:nvPr/>
+        </p:nvCxnSpPr>
+        <p:spPr>
+          <a:xfrm>
+            <a:off x="4686300" y="378069"/>
+            <a:ext cx="7505700" cy="0"/>
+          </a:xfrm>
+          <a:prstGeom prst="line">
+            <a:avLst/>
+          </a:prstGeom>
+        </p:spPr>
+        <p:style>
+          <a:lnRef idx="2">
+            <a:schemeClr val="accent5"/>
+          </a:lnRef>
+          <a:fillRef idx="0">
+            <a:schemeClr val="accent5"/>
+          </a:fillRef>
+          <a:effectRef idx="1">
+            <a:schemeClr val="accent5"/>
+          </a:effectRef>
+          <a:fontRef idx="minor">
+            <a:schemeClr val="tx1"/>
+          </a:fontRef>
+        </p:style>
+      </p:cxnSp>
+      <p:cxnSp>
+        <p:nvCxnSpPr>
+          <p:cNvPr id="16" name="직선 연결선 15"/>
+          <p:cNvCxnSpPr/>
+          <p:nvPr/>
+        </p:nvCxnSpPr>
+        <p:spPr>
+          <a:xfrm>
+            <a:off x="11614638" y="378069"/>
+            <a:ext cx="0" cy="6479931"/>
+          </a:xfrm>
+          <a:prstGeom prst="line">
+            <a:avLst/>
+          </a:prstGeom>
+        </p:spPr>
+        <p:style>
+          <a:lnRef idx="1">
+            <a:schemeClr val="accent1"/>
+          </a:lnRef>
+          <a:fillRef idx="0">
+            <a:schemeClr val="accent1"/>
+          </a:fillRef>
+          <a:effectRef idx="0">
+            <a:schemeClr val="accent1"/>
+          </a:effectRef>
+          <a:fontRef idx="minor">
+            <a:schemeClr val="tx1"/>
+          </a:fontRef>
+        </p:style>
+      </p:cxnSp>
+      <p:cxnSp>
+        <p:nvCxnSpPr>
+          <p:cNvPr id="17" name="직선 연결선 16"/>
+          <p:cNvCxnSpPr/>
+          <p:nvPr/>
+        </p:nvCxnSpPr>
+        <p:spPr>
+          <a:xfrm flipH="1">
+            <a:off x="0" y="6277708"/>
+            <a:ext cx="11614639" cy="0"/>
+          </a:xfrm>
+          <a:prstGeom prst="line">
+            <a:avLst/>
+          </a:prstGeom>
+        </p:spPr>
+        <p:style>
+          <a:lnRef idx="1">
+            <a:schemeClr val="accent1"/>
+          </a:lnRef>
+          <a:fillRef idx="0">
+            <a:schemeClr val="accent1"/>
+          </a:fillRef>
+          <a:effectRef idx="0">
+            <a:schemeClr val="accent1"/>
+          </a:effectRef>
+          <a:fontRef idx="minor">
+            <a:schemeClr val="tx1"/>
+          </a:fontRef>
+        </p:style>
+      </p:cxnSp>
+      <p:cxnSp>
+        <p:nvCxnSpPr>
+          <p:cNvPr id="18" name="직선 연결선 17"/>
+          <p:cNvCxnSpPr/>
+          <p:nvPr/>
+        </p:nvCxnSpPr>
+        <p:spPr>
+          <a:xfrm>
+            <a:off x="422031" y="501162"/>
+            <a:ext cx="0" cy="5776546"/>
+          </a:xfrm>
+          <a:prstGeom prst="line">
+            <a:avLst/>
+          </a:prstGeom>
+        </p:spPr>
+        <p:style>
+          <a:lnRef idx="1">
+            <a:schemeClr val="accent1"/>
+          </a:lnRef>
+          <a:fillRef idx="0">
+            <a:schemeClr val="accent1"/>
+          </a:fillRef>
+          <a:effectRef idx="0">
+            <a:schemeClr val="accent1"/>
+          </a:effectRef>
+          <a:fontRef idx="minor">
+            <a:schemeClr val="tx1"/>
+          </a:fontRef>
+        </p:style>
+      </p:cxnSp>
     </p:spTree>
     <p:extLst>
       <p:ext uri="{BB962C8B-B14F-4D97-AF65-F5344CB8AC3E}">

</xml_diff>